<commit_message>
first step + history
</commit_message>
<xml_diff>
--- a/#2 React Intro + JSX/2017.04.06 React Intro.pptx
+++ b/#2 React Intro + JSX/2017.04.06 React Intro.pptx
@@ -31161,7 +31161,7 @@
         <p:spPr>
           <a:xfrm>
             <a:off x="128954" y="1844675"/>
-            <a:ext cx="11676184" cy="2996956"/>
+            <a:ext cx="11676184" cy="4207782"/>
           </a:xfrm>
           <a:prstGeom prst="rect">
             <a:avLst/>
@@ -31323,12 +31323,51 @@
           </a:lstStyle>
           <a:p>
             <a:r>
+              <a:rPr lang="pl-PL" dirty="0" err="1" smtClean="0">
+                <a:solidFill>
+                  <a:schemeClr val="bg2"/>
+                </a:solidFill>
+              </a:rPr>
+              <a:t>Install</a:t>
+            </a:r>
+            <a:r>
+              <a:rPr lang="pl-PL" dirty="0" smtClean="0">
+                <a:solidFill>
+                  <a:schemeClr val="bg2"/>
+                </a:solidFill>
+              </a:rPr>
+              <a:t> git, node.js and </a:t>
+            </a:r>
+            <a:r>
+              <a:rPr lang="pl-PL" dirty="0" err="1" smtClean="0">
+                <a:solidFill>
+                  <a:schemeClr val="bg2"/>
+                </a:solidFill>
+              </a:rPr>
+              <a:t>yarn</a:t>
+            </a:r>
+            <a:endParaRPr lang="pl-PL" dirty="0" smtClean="0">
+              <a:solidFill>
+                <a:schemeClr val="bg2"/>
+              </a:solidFill>
+            </a:endParaRPr>
+          </a:p>
+          <a:p>
+            <a:r>
+              <a:rPr lang="pl-PL" dirty="0" smtClean="0">
+                <a:solidFill>
+                  <a:schemeClr val="bg2"/>
+                </a:solidFill>
+              </a:rPr>
+              <a:t>git </a:t>
+            </a:r>
+            <a:r>
               <a:rPr lang="pl-PL" dirty="0">
                 <a:solidFill>
                   <a:schemeClr val="bg2"/>
                 </a:solidFill>
               </a:rPr>
-              <a:t>git clone https://</a:t>
+              <a:t>clone https://</a:t>
             </a:r>
             <a:r>
               <a:rPr lang="pl-PL" dirty="0" smtClean="0">
@@ -31338,6 +31377,133 @@
               </a:rPr>
               <a:t>github.com/infusion-wro/infusion.js</a:t>
             </a:r>
+          </a:p>
+          <a:p>
+            <a:r>
+              <a:rPr lang="pl-PL" dirty="0">
+                <a:solidFill>
+                  <a:schemeClr val="bg2"/>
+                </a:solidFill>
+              </a:rPr>
+              <a:t>git </a:t>
+            </a:r>
+            <a:r>
+              <a:rPr lang="pl-PL" dirty="0" err="1" smtClean="0">
+                <a:solidFill>
+                  <a:schemeClr val="bg2"/>
+                </a:solidFill>
+              </a:rPr>
+              <a:t>checkout</a:t>
+            </a:r>
+            <a:r>
+              <a:rPr lang="pl-PL" dirty="0">
+                <a:solidFill>
+                  <a:schemeClr val="bg2"/>
+                </a:solidFill>
+              </a:rPr>
+              <a:t> </a:t>
+            </a:r>
+            <a:r>
+              <a:rPr lang="pl-PL" dirty="0" smtClean="0">
+                <a:solidFill>
+                  <a:schemeClr val="bg2"/>
+                </a:solidFill>
+              </a:rPr>
+              <a:t>ProReactChapter0</a:t>
+            </a:r>
+          </a:p>
+          <a:p>
+            <a:r>
+              <a:rPr lang="pl-PL" dirty="0" smtClean="0">
+                <a:solidFill>
+                  <a:schemeClr val="bg2"/>
+                </a:solidFill>
+              </a:rPr>
+              <a:t>cd </a:t>
+            </a:r>
+            <a:r>
+              <a:rPr lang="pl-PL" dirty="0" err="1" smtClean="0">
+                <a:solidFill>
+                  <a:schemeClr val="bg2"/>
+                </a:solidFill>
+              </a:rPr>
+              <a:t>Kanban</a:t>
+            </a:r>
+            <a:endParaRPr lang="pl-PL" dirty="0">
+              <a:solidFill>
+                <a:schemeClr val="bg2"/>
+              </a:solidFill>
+            </a:endParaRPr>
+          </a:p>
+          <a:p>
+            <a:r>
+              <a:rPr lang="pl-PL" dirty="0" err="1" smtClean="0">
+                <a:solidFill>
+                  <a:schemeClr val="bg2"/>
+                </a:solidFill>
+              </a:rPr>
+              <a:t>yarn</a:t>
+            </a:r>
+            <a:endParaRPr lang="pl-PL" dirty="0">
+              <a:solidFill>
+                <a:schemeClr val="bg2"/>
+              </a:solidFill>
+            </a:endParaRPr>
+          </a:p>
+          <a:p>
+            <a:r>
+              <a:rPr lang="pl-PL" dirty="0" smtClean="0">
+                <a:solidFill>
+                  <a:schemeClr val="bg2"/>
+                </a:solidFill>
+              </a:rPr>
+              <a:t>//</a:t>
+            </a:r>
+            <a:r>
+              <a:rPr lang="pl-PL" dirty="0" err="1" smtClean="0">
+                <a:solidFill>
+                  <a:schemeClr val="bg2"/>
+                </a:solidFill>
+              </a:rPr>
+              <a:t>or</a:t>
+            </a:r>
+            <a:r>
+              <a:rPr lang="pl-PL" dirty="0" smtClean="0">
+                <a:solidFill>
+                  <a:schemeClr val="bg2"/>
+                </a:solidFill>
+              </a:rPr>
+              <a:t> </a:t>
+            </a:r>
+            <a:r>
+              <a:rPr lang="pl-PL" dirty="0" err="1" smtClean="0">
+                <a:solidFill>
+                  <a:schemeClr val="bg2"/>
+                </a:solidFill>
+              </a:rPr>
+              <a:t>npm</a:t>
+            </a:r>
+            <a:r>
+              <a:rPr lang="pl-PL" dirty="0" smtClean="0">
+                <a:solidFill>
+                  <a:schemeClr val="bg2"/>
+                </a:solidFill>
+              </a:rPr>
+              <a:t> </a:t>
+            </a:r>
+            <a:r>
+              <a:rPr lang="pl-PL" dirty="0" err="1" smtClean="0">
+                <a:solidFill>
+                  <a:schemeClr val="bg2"/>
+                </a:solidFill>
+              </a:rPr>
+              <a:t>install</a:t>
+            </a:r>
+            <a:endParaRPr lang="pl-PL" dirty="0">
+              <a:solidFill>
+                <a:schemeClr val="bg2"/>
+              </a:solidFill>
+            </a:endParaRPr>
           </a:p>
         </p:txBody>
       </p:sp>

</xml_diff>